<commit_message>
added everything for poster demo, along with some plotting for fps vs grid size
</commit_message>
<xml_diff>
--- a/Poster.pptx
+++ b/Poster.pptx
@@ -1,6 +1,6 @@
 
 <file path=ppt/presentation.xml><?xml version="1.0" encoding="utf-8"?>
-<p:presentation xmlns:a="http://schemas.openxmlformats.org/drawingml/2006/main" xmlns:r="http://schemas.openxmlformats.org/officeDocument/2006/relationships" xmlns:p="http://schemas.openxmlformats.org/presentationml/2006/main" compatMode="1" saveSubsetFonts="1" autoCompressPictures="0">
+<p:presentation xmlns:a="http://schemas.openxmlformats.org/drawingml/2006/main" xmlns:r="http://schemas.openxmlformats.org/officeDocument/2006/relationships" xmlns:p="http://schemas.openxmlformats.org/presentationml/2006/main" saveSubsetFonts="1" autoCompressPictures="0">
   <p:sldMasterIdLst>
     <p:sldMasterId id="2147483648" r:id="rId1"/>
   </p:sldMasterIdLst>
@@ -279,7 +279,7 @@
               <a:pPr>
                 <a:defRPr/>
               </a:pPr>
-              <a:t>4/30/23</a:t>
+              <a:t>5/2/23</a:t>
             </a:fld>
             <a:endParaRPr lang="en-US" altLang="en-US"/>
           </a:p>
@@ -2694,13 +2694,152 @@
           </a:xfrm>
         </p:spPr>
         <p:txBody>
-          <a:bodyPr/>
+          <a:bodyPr>
+            <a:normAutofit fontScale="92500" lnSpcReduction="10000"/>
+          </a:bodyPr>
           <a:lstStyle/>
           <a:p>
             <a:pPr defTabSz="1462690">
               <a:defRPr/>
             </a:pPr>
-            <a:endParaRPr/>
+            <a:r>
+              <a:rPr lang="en-US" sz="1600" dirty="0"/>
+              <a:t>Special thanks: Dr. Schuman</a:t>
+            </a:r>
+          </a:p>
+          <a:p>
+            <a:pPr defTabSz="1462690">
+              <a:defRPr/>
+            </a:pPr>
+            <a:r>
+              <a:rPr lang="en-US" sz="1600" dirty="0"/>
+              <a:t>[1]Daniel </a:t>
+            </a:r>
+            <a:r>
+              <a:rPr lang="en-US" sz="1600" dirty="0" err="1"/>
+              <a:t>Cagigas</a:t>
+            </a:r>
+            <a:r>
+              <a:rPr lang="en-US" sz="1600" dirty="0"/>
+              <a:t>-Mu ̃</a:t>
+            </a:r>
+            <a:r>
+              <a:rPr lang="en-US" sz="1600" dirty="0" err="1"/>
+              <a:t>niz</a:t>
+            </a:r>
+            <a:r>
+              <a:rPr lang="en-US" sz="1600" dirty="0"/>
+              <a:t> et al. “Efficient simulation execution of cellular au-</a:t>
+            </a:r>
+            <a:br>
+              <a:rPr lang="en-US" sz="1600" dirty="0"/>
+            </a:br>
+            <a:r>
+              <a:rPr lang="en-US" sz="1600" dirty="0" err="1"/>
+              <a:t>tomata</a:t>
+            </a:r>
+            <a:r>
+              <a:rPr lang="en-US" sz="1600" dirty="0"/>
+              <a:t> on GPU”. In: Simulation Modelling Practice and Theory 118 (2022),</a:t>
+            </a:r>
+            <a:br>
+              <a:rPr lang="en-US" sz="1600" dirty="0"/>
+            </a:br>
+            <a:r>
+              <a:rPr lang="en-US" sz="1600" dirty="0"/>
+              <a:t>p. 102519.</a:t>
+            </a:r>
+            <a:br>
+              <a:rPr lang="en-US" sz="1600" dirty="0"/>
+            </a:br>
+            <a:r>
+              <a:rPr lang="en-US" sz="1600" dirty="0"/>
+              <a:t>[2] </a:t>
+            </a:r>
+            <a:r>
+              <a:rPr lang="en-US" sz="1600" dirty="0" err="1"/>
+              <a:t>Nuttapong</a:t>
+            </a:r>
+            <a:r>
+              <a:rPr lang="en-US" sz="1600" dirty="0"/>
+              <a:t> </a:t>
+            </a:r>
+            <a:r>
+              <a:rPr lang="en-US" sz="1600" dirty="0" err="1"/>
+              <a:t>Chentanez</a:t>
+            </a:r>
+            <a:r>
+              <a:rPr lang="en-US" sz="1600" dirty="0"/>
+              <a:t> and Matthias M ̈</a:t>
+            </a:r>
+            <a:r>
+              <a:rPr lang="en-US" sz="1600" dirty="0" err="1"/>
+              <a:t>uller</a:t>
+            </a:r>
+            <a:r>
+              <a:rPr lang="en-US" sz="1600" dirty="0"/>
+              <a:t>. “Real-time Eulerian water sim-</a:t>
+            </a:r>
+            <a:br>
+              <a:rPr lang="en-US" sz="1600" dirty="0"/>
+            </a:br>
+            <a:r>
+              <a:rPr lang="en-US" sz="1600" dirty="0" err="1"/>
+              <a:t>ulation</a:t>
+            </a:r>
+            <a:r>
+              <a:rPr lang="en-US" sz="1600" dirty="0"/>
+              <a:t> using a restricted tall cell grid”. In: ACM </a:t>
+            </a:r>
+            <a:r>
+              <a:rPr lang="en-US" sz="1600" dirty="0" err="1"/>
+              <a:t>Siggraph</a:t>
+            </a:r>
+            <a:r>
+              <a:rPr lang="en-US" sz="1600" dirty="0"/>
+              <a:t> 2011 Papers.</a:t>
+            </a:r>
+            <a:br>
+              <a:rPr lang="en-US" sz="1600" dirty="0"/>
+            </a:br>
+            <a:r>
+              <a:rPr lang="en-US" sz="1600" dirty="0"/>
+              <a:t>2011, pp. 1–10.</a:t>
+            </a:r>
+            <a:br>
+              <a:rPr lang="en-US" sz="1600" dirty="0"/>
+            </a:br>
+            <a:r>
+              <a:rPr lang="en-US" sz="1600" dirty="0"/>
+              <a:t>[3] G ́</a:t>
+            </a:r>
+            <a:r>
+              <a:rPr lang="en-US" sz="1600" dirty="0" err="1"/>
+              <a:t>erard</a:t>
+            </a:r>
+            <a:r>
+              <a:rPr lang="en-US" sz="1600" dirty="0"/>
+              <a:t> Y </a:t>
+            </a:r>
+            <a:r>
+              <a:rPr lang="en-US" sz="1600" dirty="0" err="1"/>
+              <a:t>Vichniac</a:t>
+            </a:r>
+            <a:r>
+              <a:rPr lang="en-US" sz="1600" dirty="0"/>
+              <a:t>. “Simulating physics with cellular automata”. In: Phys-</a:t>
+            </a:r>
+            <a:br>
+              <a:rPr lang="en-US" sz="1600" dirty="0"/>
+            </a:br>
+            <a:r>
+              <a:rPr lang="en-US" sz="1600" dirty="0" err="1"/>
+              <a:t>ica</a:t>
+            </a:r>
+            <a:r>
+              <a:rPr lang="en-US" sz="1600" dirty="0"/>
+              <a:t> D: Nonlinear Phenomena 10.1-2 (1984), pp. 96–116.</a:t>
+            </a:r>
           </a:p>
         </p:txBody>
       </p:sp>
@@ -2722,7 +2861,7 @@
         </p:nvSpPr>
         <p:spPr>
           <a:xfrm>
-            <a:off x="896938" y="6654800"/>
+            <a:off x="785758" y="5377732"/>
             <a:ext cx="9693275" cy="20656550"/>
           </a:xfrm>
         </p:spPr>
@@ -2748,7 +2887,7 @@
             </a:pPr>
             <a:r>
               <a:rPr lang="en-US" dirty="0"/>
-              <a:t>Fluid physics are slow to run for applications like video games. Can we approximate them with cellular automata, and run that cellular automata system on the GPU to exploit CA parallelism?</a:t>
+              <a:t>Fluid physics are computationally expensive for applications like video games. Can we approximate them with cellular automata, and run that cellular automata system on the GPU to exploit CA parallelism?</a:t>
             </a:r>
           </a:p>
           <a:p>
@@ -2801,6 +2940,15 @@
             </a:r>
           </a:p>
           <a:p>
+            <a:pPr marL="876315" lvl="2" indent="-571500" defTabSz="1462690">
+              <a:defRPr/>
+            </a:pPr>
+            <a:r>
+              <a:rPr lang="en-US" dirty="0"/>
+              <a:t>Constrained to 2D</a:t>
+            </a:r>
+          </a:p>
+          <a:p>
             <a:pPr marL="571500" lvl="1" indent="-571500" defTabSz="1462690">
               <a:buFont typeface="Arial" panose="020B0604020202020204" pitchFamily="34" charset="0"/>
               <a:buChar char="•"/>
@@ -2808,7 +2956,97 @@
             </a:pPr>
             <a:r>
               <a:rPr lang="en-US" dirty="0"/>
-              <a:t>CA rules (with pictures)</a:t>
+              <a:t>CA rules</a:t>
+            </a:r>
+          </a:p>
+          <a:p>
+            <a:pPr marL="876315" lvl="2" indent="-571500" defTabSz="1462690">
+              <a:defRPr/>
+            </a:pPr>
+            <a:r>
+              <a:rPr lang="en-US" dirty="0"/>
+              <a:t>Rule #1: Flow Downward</a:t>
+            </a:r>
+          </a:p>
+          <a:p>
+            <a:pPr marL="876315" lvl="2" indent="-571500" defTabSz="1462690">
+              <a:defRPr/>
+            </a:pPr>
+            <a:endParaRPr lang="en-US" dirty="0"/>
+          </a:p>
+          <a:p>
+            <a:pPr marL="876315" lvl="2" indent="-571500" defTabSz="1462690">
+              <a:defRPr/>
+            </a:pPr>
+            <a:endParaRPr lang="en-US" dirty="0"/>
+          </a:p>
+          <a:p>
+            <a:pPr marL="876315" lvl="2" indent="-571500" defTabSz="1462690">
+              <a:defRPr/>
+            </a:pPr>
+            <a:endParaRPr lang="en-US" dirty="0"/>
+          </a:p>
+          <a:p>
+            <a:pPr marL="876315" lvl="2" indent="-571500" defTabSz="1462690">
+              <a:defRPr/>
+            </a:pPr>
+            <a:endParaRPr lang="en-US" dirty="0"/>
+          </a:p>
+          <a:p>
+            <a:pPr marL="876315" lvl="2" indent="-571500" defTabSz="1462690">
+              <a:defRPr/>
+            </a:pPr>
+            <a:endParaRPr lang="en-US" dirty="0"/>
+          </a:p>
+          <a:p>
+            <a:pPr marL="876315" lvl="2" indent="-571500" defTabSz="1462690">
+              <a:defRPr/>
+            </a:pPr>
+            <a:endParaRPr lang="en-US" dirty="0"/>
+          </a:p>
+          <a:p>
+            <a:pPr marL="876315" lvl="2" indent="-571500" defTabSz="1462690">
+              <a:defRPr/>
+            </a:pPr>
+            <a:endParaRPr lang="en-US" dirty="0"/>
+          </a:p>
+          <a:p>
+            <a:pPr marL="876315" lvl="2" indent="-571500" defTabSz="1462690">
+              <a:defRPr/>
+            </a:pPr>
+            <a:endParaRPr lang="en-US" dirty="0"/>
+          </a:p>
+          <a:p>
+            <a:pPr marL="876315" lvl="2" indent="-571500" defTabSz="1462690">
+              <a:defRPr/>
+            </a:pPr>
+            <a:endParaRPr lang="en-US" dirty="0"/>
+          </a:p>
+          <a:p>
+            <a:pPr marL="876315" lvl="2" indent="-571500" defTabSz="1462690">
+              <a:defRPr/>
+            </a:pPr>
+            <a:endParaRPr lang="en-US" dirty="0"/>
+          </a:p>
+          <a:p>
+            <a:pPr marL="876315" lvl="2" indent="-571500" defTabSz="1462690">
+              <a:defRPr/>
+            </a:pPr>
+            <a:endParaRPr lang="en-US" dirty="0"/>
+          </a:p>
+          <a:p>
+            <a:pPr marL="876315" lvl="2" indent="-571500" defTabSz="1462690">
+              <a:defRPr/>
+            </a:pPr>
+            <a:endParaRPr lang="en-US" dirty="0"/>
+          </a:p>
+          <a:p>
+            <a:pPr marL="876315" lvl="2" indent="-571500" defTabSz="1462690">
+              <a:defRPr/>
+            </a:pPr>
+            <a:r>
+              <a:rPr lang="en-US" dirty="0"/>
+              <a:t>Rule #2: If we can’t flow down, try sideways</a:t>
             </a:r>
           </a:p>
         </p:txBody>
@@ -2831,7 +3069,7 @@
         </p:nvSpPr>
         <p:spPr>
           <a:xfrm>
-            <a:off x="11287125" y="6654800"/>
+            <a:off x="11175945" y="5377732"/>
             <a:ext cx="9691688" cy="20656550"/>
           </a:xfrm>
         </p:spPr>
@@ -2839,6 +3077,93 @@
           <a:bodyPr/>
           <a:lstStyle/>
           <a:p>
+            <a:pPr marL="571500" lvl="1" indent="-571500" defTabSz="1462690">
+              <a:buFont typeface="Arial" panose="020B0604020202020204" pitchFamily="34" charset="0"/>
+              <a:buChar char="•"/>
+              <a:defRPr/>
+            </a:pPr>
+            <a:r>
+              <a:rPr lang="en-US" dirty="0"/>
+              <a:t>Rule #3: A cell can be overfilled after performing the first two rules. If it is, try and flow up.</a:t>
+            </a:r>
+          </a:p>
+          <a:p>
+            <a:pPr marL="571500" lvl="1" indent="-571500" defTabSz="1462690">
+              <a:buFont typeface="Arial" panose="020B0604020202020204" pitchFamily="34" charset="0"/>
+              <a:buChar char="•"/>
+              <a:defRPr/>
+            </a:pPr>
+            <a:endParaRPr lang="en-US" dirty="0"/>
+          </a:p>
+          <a:p>
+            <a:pPr marL="571500" lvl="1" indent="-571500" defTabSz="1462690">
+              <a:buFont typeface="Arial" panose="020B0604020202020204" pitchFamily="34" charset="0"/>
+              <a:buChar char="•"/>
+              <a:defRPr/>
+            </a:pPr>
+            <a:endParaRPr lang="en-US" dirty="0"/>
+          </a:p>
+          <a:p>
+            <a:pPr marL="571500" lvl="1" indent="-571500" defTabSz="1462690">
+              <a:buFont typeface="Arial" panose="020B0604020202020204" pitchFamily="34" charset="0"/>
+              <a:buChar char="•"/>
+              <a:defRPr/>
+            </a:pPr>
+            <a:endParaRPr lang="en-US" dirty="0"/>
+          </a:p>
+          <a:p>
+            <a:pPr marL="571500" lvl="1" indent="-571500" defTabSz="1462690">
+              <a:buFont typeface="Arial" panose="020B0604020202020204" pitchFamily="34" charset="0"/>
+              <a:buChar char="•"/>
+              <a:defRPr/>
+            </a:pPr>
+            <a:endParaRPr lang="en-US" dirty="0"/>
+          </a:p>
+          <a:p>
+            <a:pPr marL="571500" lvl="1" indent="-571500" defTabSz="1462690">
+              <a:buFont typeface="Arial" panose="020B0604020202020204" pitchFamily="34" charset="0"/>
+              <a:buChar char="•"/>
+              <a:defRPr/>
+            </a:pPr>
+            <a:endParaRPr lang="en-US" dirty="0"/>
+          </a:p>
+          <a:p>
+            <a:pPr marL="571500" lvl="1" indent="-571500" defTabSz="1462690">
+              <a:buFont typeface="Arial" panose="020B0604020202020204" pitchFamily="34" charset="0"/>
+              <a:buChar char="•"/>
+              <a:defRPr/>
+            </a:pPr>
+            <a:endParaRPr lang="en-US" dirty="0"/>
+          </a:p>
+          <a:p>
+            <a:pPr marL="571500" lvl="1" indent="-571500" defTabSz="1462690">
+              <a:buFont typeface="Arial" panose="020B0604020202020204" pitchFamily="34" charset="0"/>
+              <a:buChar char="•"/>
+              <a:defRPr/>
+            </a:pPr>
+            <a:endParaRPr lang="en-US" dirty="0"/>
+          </a:p>
+          <a:p>
+            <a:pPr marL="571500" lvl="1" indent="-571500" defTabSz="1462690">
+              <a:buFont typeface="Arial" panose="020B0604020202020204" pitchFamily="34" charset="0"/>
+              <a:buChar char="•"/>
+              <a:defRPr/>
+            </a:pPr>
+            <a:endParaRPr lang="en-US" dirty="0"/>
+          </a:p>
+          <a:p>
+            <a:pPr lvl="1" defTabSz="1462690">
+              <a:defRPr/>
+            </a:pPr>
+            <a:endParaRPr lang="en-US" dirty="0"/>
+          </a:p>
+          <a:p>
+            <a:pPr lvl="1" defTabSz="1462690">
+              <a:defRPr/>
+            </a:pPr>
+            <a:endParaRPr lang="en-US" dirty="0"/>
+          </a:p>
+          <a:p>
             <a:pPr marL="571500" indent="-571500" defTabSz="1462690">
               <a:buFont typeface="Arial" panose="020B0604020202020204" pitchFamily="34" charset="0"/>
               <a:buChar char="•"/>
@@ -2846,7 +3171,7 @@
             </a:pPr>
             <a:r>
               <a:rPr lang="en-US" dirty="0"/>
-              <a:t>Conclusion</a:t>
+              <a:t>Results</a:t>
             </a:r>
           </a:p>
           <a:p>
@@ -2857,8 +3182,63 @@
             </a:pPr>
             <a:r>
               <a:rPr lang="en-US" dirty="0"/>
-              <a:t>Results</a:t>
-            </a:r>
+              <a:t>Automata Behavior</a:t>
+            </a:r>
+          </a:p>
+          <a:p>
+            <a:pPr marL="876315" lvl="2" indent="-571500" defTabSz="1462690">
+              <a:defRPr/>
+            </a:pPr>
+            <a:r>
+              <a:rPr lang="en-US" dirty="0"/>
+              <a:t>Displays some properties of real-world water</a:t>
+            </a:r>
+          </a:p>
+          <a:p>
+            <a:pPr marL="876315" lvl="2" indent="-571500" defTabSz="1462690">
+              <a:defRPr/>
+            </a:pPr>
+            <a:r>
+              <a:rPr lang="en-US" dirty="0"/>
+              <a:t>Water particles fill their container and fall with gravity</a:t>
+            </a:r>
+          </a:p>
+          <a:p>
+            <a:pPr marL="876315" lvl="2" indent="-571500" defTabSz="1462690">
+              <a:defRPr/>
+            </a:pPr>
+            <a:endParaRPr lang="en-US" dirty="0"/>
+          </a:p>
+          <a:p>
+            <a:pPr marL="876315" lvl="2" indent="-571500" defTabSz="1462690">
+              <a:defRPr/>
+            </a:pPr>
+            <a:endParaRPr lang="en-US" dirty="0"/>
+          </a:p>
+          <a:p>
+            <a:pPr marL="876315" lvl="2" indent="-571500" defTabSz="1462690">
+              <a:defRPr/>
+            </a:pPr>
+            <a:endParaRPr lang="en-US" dirty="0"/>
+          </a:p>
+          <a:p>
+            <a:pPr marL="876315" lvl="2" indent="-571500" defTabSz="1462690">
+              <a:defRPr/>
+            </a:pPr>
+            <a:endParaRPr lang="en-US" dirty="0"/>
+          </a:p>
+          <a:p>
+            <a:pPr marL="876315" lvl="2" indent="-571500" defTabSz="1462690">
+              <a:defRPr/>
+            </a:pPr>
+            <a:endParaRPr lang="en-US" dirty="0"/>
+          </a:p>
+          <a:p>
+            <a:pPr lvl="2" indent="0" defTabSz="1462690">
+              <a:buNone/>
+              <a:defRPr/>
+            </a:pPr>
+            <a:endParaRPr lang="en-US" dirty="0"/>
           </a:p>
           <a:p>
             <a:pPr marL="571500" lvl="1" indent="-571500" defTabSz="1462690">
@@ -2867,10 +3247,36 @@
               <a:defRPr/>
             </a:pPr>
             <a:r>
-              <a:rPr lang="en-US"/>
-              <a:t>Current limitations</a:t>
-            </a:r>
-            <a:endParaRPr lang="en-US" dirty="0"/>
+              <a:rPr lang="en-US" dirty="0"/>
+              <a:t>Performance (low-end machine without dedicated GPU)</a:t>
+            </a:r>
+          </a:p>
+          <a:p>
+            <a:pPr marL="876315" lvl="2" indent="-571500" defTabSz="1462690">
+              <a:defRPr/>
+            </a:pPr>
+            <a:r>
+              <a:rPr lang="en-US" dirty="0"/>
+              <a:t>Simulation can comfortably run with 4,000+ cells at 60fps.</a:t>
+            </a:r>
+          </a:p>
+          <a:p>
+            <a:pPr marL="876315" lvl="2" indent="-571500" defTabSz="1462690">
+              <a:defRPr/>
+            </a:pPr>
+            <a:r>
+              <a:rPr lang="en-US" dirty="0"/>
+              <a:t>Can run at 30fps with 10,000+ cells</a:t>
+            </a:r>
+          </a:p>
+          <a:p>
+            <a:pPr marL="876315" lvl="2" indent="-571500" defTabSz="1462690">
+              <a:defRPr/>
+            </a:pPr>
+            <a:r>
+              <a:rPr lang="en-US" dirty="0"/>
+              <a:t>Main bottleneck is CPU</a:t>
+            </a:r>
           </a:p>
           <a:p>
             <a:pPr marL="571500" lvl="1" indent="-571500" defTabSz="1462690">
@@ -2880,9 +3286,848 @@
             </a:pPr>
             <a:r>
               <a:rPr lang="en-US" dirty="0"/>
+              <a:t>Current limitations</a:t>
+            </a:r>
+          </a:p>
+          <a:p>
+            <a:pPr marL="876315" lvl="2" indent="-571500" defTabSz="1462690">
+              <a:defRPr/>
+            </a:pPr>
+            <a:r>
+              <a:rPr lang="en-US" dirty="0"/>
+              <a:t>Cells currently have no concept of inertia, meaning waves are not realistic. Lots of data must be transferred between CPU and GPU each frame.</a:t>
+            </a:r>
+          </a:p>
+          <a:p>
+            <a:pPr marL="571500" indent="-571500" defTabSz="1462690">
+              <a:buFont typeface="Arial" panose="020B0604020202020204" pitchFamily="34" charset="0"/>
+              <a:buChar char="•"/>
+              <a:defRPr/>
+            </a:pPr>
+            <a:r>
+              <a:rPr lang="en-US" dirty="0"/>
+              <a:t>Conclusion</a:t>
+            </a:r>
+          </a:p>
+          <a:p>
+            <a:pPr marL="571500" lvl="1" indent="-571500" defTabSz="1462690">
+              <a:buFont typeface="Arial" panose="020B0604020202020204" pitchFamily="34" charset="0"/>
+              <a:buChar char="•"/>
+              <a:defRPr/>
+            </a:pPr>
+            <a:r>
+              <a:rPr lang="en-US" dirty="0"/>
+              <a:t>Using the GPU it is possible to make highly performant automata that approximate fluid flow, but more work must be done to make that flow a good simulation of real-world fluid</a:t>
+            </a:r>
+          </a:p>
+          <a:p>
+            <a:pPr marL="571500" lvl="1" indent="-571500" defTabSz="1462690">
+              <a:buFont typeface="Arial" panose="020B0604020202020204" pitchFamily="34" charset="0"/>
+              <a:buChar char="•"/>
+              <a:defRPr/>
+            </a:pPr>
+            <a:r>
+              <a:rPr lang="en-US" dirty="0"/>
               <a:t>Future work</a:t>
             </a:r>
+          </a:p>
+          <a:p>
+            <a:pPr marL="876315" lvl="2" indent="-571500" defTabSz="1462690">
+              <a:defRPr/>
+            </a:pPr>
+            <a:r>
+              <a:rPr lang="en-US" dirty="0"/>
+              <a:t>Main overhead is CPU, as each cell uses the CPU every frame to determine how full it should be. This could be offloaded to a shader, which would also reduce memory that has to go back to the CPU each frame.</a:t>
+            </a:r>
+          </a:p>
+          <a:p>
+            <a:pPr marL="876315" lvl="2" indent="-571500" defTabSz="1462690">
+              <a:defRPr/>
+            </a:pPr>
+            <a:r>
+              <a:rPr lang="en-US" dirty="0"/>
+              <a:t>Such a shader could also make the water look more realistic.</a:t>
+            </a:r>
+          </a:p>
+          <a:p>
+            <a:pPr marL="876315" lvl="2" indent="-571500" defTabSz="1462690">
+              <a:defRPr/>
+            </a:pPr>
+            <a:r>
+              <a:rPr lang="en-US" dirty="0"/>
+              <a:t>More CA rules could be added that take into account inertia and other real-world physics.</a:t>
+            </a:r>
             <a:endParaRPr dirty="0"/>
+          </a:p>
+        </p:txBody>
+      </p:sp>
+      <p:pic>
+        <p:nvPicPr>
+          <p:cNvPr id="7" name="Picture 6">
+            <a:extLst>
+              <a:ext uri="{FF2B5EF4-FFF2-40B4-BE49-F238E27FC236}">
+                <a16:creationId xmlns:a16="http://schemas.microsoft.com/office/drawing/2014/main" id="{D3D98B46-43C3-3747-3F1E-FB0998E5D240}"/>
+              </a:ext>
+            </a:extLst>
+          </p:cNvPr>
+          <p:cNvPicPr>
+            <a:picLocks noChangeAspect="1"/>
+          </p:cNvPicPr>
+          <p:nvPr/>
+        </p:nvPicPr>
+        <p:blipFill>
+          <a:blip r:embed="rId2"/>
+          <a:stretch>
+            <a:fillRect/>
+          </a:stretch>
+        </p:blipFill>
+        <p:spPr>
+          <a:xfrm>
+            <a:off x="1315681" y="12480764"/>
+            <a:ext cx="3150470" cy="4382016"/>
+          </a:xfrm>
+          <a:prstGeom prst="rect">
+            <a:avLst/>
+          </a:prstGeom>
+        </p:spPr>
+      </p:pic>
+      <p:sp>
+        <p:nvSpPr>
+          <p:cNvPr id="8" name="Down Arrow 7">
+            <a:extLst>
+              <a:ext uri="{FF2B5EF4-FFF2-40B4-BE49-F238E27FC236}">
+                <a16:creationId xmlns:a16="http://schemas.microsoft.com/office/drawing/2014/main" id="{277E7738-5E6D-BA11-AEA9-388240B56856}"/>
+              </a:ext>
+            </a:extLst>
+          </p:cNvPr>
+          <p:cNvSpPr/>
+          <p:nvPr/>
+        </p:nvSpPr>
+        <p:spPr>
+          <a:xfrm>
+            <a:off x="2905204" y="13574164"/>
+            <a:ext cx="741407" cy="1186248"/>
+          </a:xfrm>
+          <a:prstGeom prst="downArrow">
+            <a:avLst/>
+          </a:prstGeom>
+          <a:solidFill>
+            <a:srgbClr val="FF0000"/>
+          </a:solidFill>
+        </p:spPr>
+        <p:style>
+          <a:lnRef idx="1">
+            <a:schemeClr val="accent1"/>
+          </a:lnRef>
+          <a:fillRef idx="3">
+            <a:schemeClr val="accent1"/>
+          </a:fillRef>
+          <a:effectRef idx="2">
+            <a:schemeClr val="accent1"/>
+          </a:effectRef>
+          <a:fontRef idx="minor">
+            <a:schemeClr val="lt1"/>
+          </a:fontRef>
+        </p:style>
+        <p:txBody>
+          <a:bodyPr rtlCol="0" anchor="ctr"/>
+          <a:lstStyle/>
+          <a:p>
+            <a:pPr algn="ctr"/>
+            <a:endParaRPr lang="en-US"/>
+          </a:p>
+        </p:txBody>
+      </p:sp>
+      <p:pic>
+        <p:nvPicPr>
+          <p:cNvPr id="9" name="Picture 8">
+            <a:extLst>
+              <a:ext uri="{FF2B5EF4-FFF2-40B4-BE49-F238E27FC236}">
+                <a16:creationId xmlns:a16="http://schemas.microsoft.com/office/drawing/2014/main" id="{4FA13B6E-48A1-1695-4CAD-1A740176C3E4}"/>
+              </a:ext>
+            </a:extLst>
+          </p:cNvPr>
+          <p:cNvPicPr>
+            <a:picLocks noChangeAspect="1"/>
+          </p:cNvPicPr>
+          <p:nvPr/>
+        </p:nvPicPr>
+        <p:blipFill>
+          <a:blip r:embed="rId3"/>
+          <a:stretch>
+            <a:fillRect/>
+          </a:stretch>
+        </p:blipFill>
+        <p:spPr>
+          <a:xfrm>
+            <a:off x="5632395" y="12480763"/>
+            <a:ext cx="3150470" cy="4382017"/>
+          </a:xfrm>
+          <a:prstGeom prst="rect">
+            <a:avLst/>
+          </a:prstGeom>
+        </p:spPr>
+      </p:pic>
+      <p:sp>
+        <p:nvSpPr>
+          <p:cNvPr id="10" name="Right Arrow 9">
+            <a:extLst>
+              <a:ext uri="{FF2B5EF4-FFF2-40B4-BE49-F238E27FC236}">
+                <a16:creationId xmlns:a16="http://schemas.microsoft.com/office/drawing/2014/main" id="{955D967D-DC49-1C2C-1109-2FA943A10CF4}"/>
+              </a:ext>
+            </a:extLst>
+          </p:cNvPr>
+          <p:cNvSpPr/>
+          <p:nvPr/>
+        </p:nvSpPr>
+        <p:spPr>
+          <a:xfrm>
+            <a:off x="4466151" y="13921872"/>
+            <a:ext cx="1166244" cy="617837"/>
+          </a:xfrm>
+          <a:prstGeom prst="rightArrow">
+            <a:avLst/>
+          </a:prstGeom>
+          <a:solidFill>
+            <a:srgbClr val="FF0000"/>
+          </a:solidFill>
+        </p:spPr>
+        <p:style>
+          <a:lnRef idx="1">
+            <a:schemeClr val="accent1"/>
+          </a:lnRef>
+          <a:fillRef idx="3">
+            <a:schemeClr val="accent1"/>
+          </a:fillRef>
+          <a:effectRef idx="2">
+            <a:schemeClr val="accent1"/>
+          </a:effectRef>
+          <a:fontRef idx="minor">
+            <a:schemeClr val="lt1"/>
+          </a:fontRef>
+        </p:style>
+        <p:txBody>
+          <a:bodyPr rtlCol="0" anchor="ctr"/>
+          <a:lstStyle/>
+          <a:p>
+            <a:pPr algn="ctr"/>
+            <a:endParaRPr lang="en-US"/>
+          </a:p>
+        </p:txBody>
+      </p:sp>
+      <p:pic>
+        <p:nvPicPr>
+          <p:cNvPr id="11" name="Picture 10">
+            <a:extLst>
+              <a:ext uri="{FF2B5EF4-FFF2-40B4-BE49-F238E27FC236}">
+                <a16:creationId xmlns:a16="http://schemas.microsoft.com/office/drawing/2014/main" id="{68A34A14-7F2F-2777-D5E4-2CAC15929B37}"/>
+              </a:ext>
+            </a:extLst>
+          </p:cNvPr>
+          <p:cNvPicPr>
+            <a:picLocks noChangeAspect="1"/>
+          </p:cNvPicPr>
+          <p:nvPr/>
+        </p:nvPicPr>
+        <p:blipFill>
+          <a:blip r:embed="rId4"/>
+          <a:stretch>
+            <a:fillRect/>
+          </a:stretch>
+        </p:blipFill>
+        <p:spPr>
+          <a:xfrm>
+            <a:off x="5632395" y="18591141"/>
+            <a:ext cx="3309798" cy="3807512"/>
+          </a:xfrm>
+          <a:prstGeom prst="rect">
+            <a:avLst/>
+          </a:prstGeom>
+        </p:spPr>
+      </p:pic>
+      <p:pic>
+        <p:nvPicPr>
+          <p:cNvPr id="12" name="Picture 11">
+            <a:extLst>
+              <a:ext uri="{FF2B5EF4-FFF2-40B4-BE49-F238E27FC236}">
+                <a16:creationId xmlns:a16="http://schemas.microsoft.com/office/drawing/2014/main" id="{D81A42A6-E414-7A17-3F21-ED5128991EF9}"/>
+              </a:ext>
+            </a:extLst>
+          </p:cNvPr>
+          <p:cNvPicPr>
+            <a:picLocks noChangeAspect="1"/>
+          </p:cNvPicPr>
+          <p:nvPr/>
+        </p:nvPicPr>
+        <p:blipFill>
+          <a:blip r:embed="rId3"/>
+          <a:stretch>
+            <a:fillRect/>
+          </a:stretch>
+        </p:blipFill>
+        <p:spPr>
+          <a:xfrm>
+            <a:off x="1303919" y="18303888"/>
+            <a:ext cx="3150470" cy="4382017"/>
+          </a:xfrm>
+          <a:prstGeom prst="rect">
+            <a:avLst/>
+          </a:prstGeom>
+        </p:spPr>
+      </p:pic>
+      <p:sp>
+        <p:nvSpPr>
+          <p:cNvPr id="13" name="Right Arrow 12">
+            <a:extLst>
+              <a:ext uri="{FF2B5EF4-FFF2-40B4-BE49-F238E27FC236}">
+                <a16:creationId xmlns:a16="http://schemas.microsoft.com/office/drawing/2014/main" id="{F1670006-695F-FD72-5E65-9F231F28AE6D}"/>
+              </a:ext>
+            </a:extLst>
+          </p:cNvPr>
+          <p:cNvSpPr/>
+          <p:nvPr/>
+        </p:nvSpPr>
+        <p:spPr>
+          <a:xfrm>
+            <a:off x="4454389" y="20075583"/>
+            <a:ext cx="1178006" cy="716692"/>
+          </a:xfrm>
+          <a:prstGeom prst="rightArrow">
+            <a:avLst/>
+          </a:prstGeom>
+          <a:solidFill>
+            <a:srgbClr val="FF0000"/>
+          </a:solidFill>
+        </p:spPr>
+        <p:style>
+          <a:lnRef idx="1">
+            <a:schemeClr val="accent1"/>
+          </a:lnRef>
+          <a:fillRef idx="3">
+            <a:schemeClr val="accent1"/>
+          </a:fillRef>
+          <a:effectRef idx="2">
+            <a:schemeClr val="accent1"/>
+          </a:effectRef>
+          <a:fontRef idx="minor">
+            <a:schemeClr val="lt1"/>
+          </a:fontRef>
+        </p:style>
+        <p:txBody>
+          <a:bodyPr rtlCol="0" anchor="ctr"/>
+          <a:lstStyle/>
+          <a:p>
+            <a:pPr algn="ctr"/>
+            <a:endParaRPr lang="en-US"/>
+          </a:p>
+        </p:txBody>
+      </p:sp>
+      <p:sp>
+        <p:nvSpPr>
+          <p:cNvPr id="14" name="Right Arrow 13">
+            <a:extLst>
+              <a:ext uri="{FF2B5EF4-FFF2-40B4-BE49-F238E27FC236}">
+                <a16:creationId xmlns:a16="http://schemas.microsoft.com/office/drawing/2014/main" id="{DEABF433-E974-562C-FB2D-6893E9134E6B}"/>
+              </a:ext>
+            </a:extLst>
+          </p:cNvPr>
+          <p:cNvSpPr/>
+          <p:nvPr/>
+        </p:nvSpPr>
+        <p:spPr>
+          <a:xfrm>
+            <a:off x="2890916" y="20075583"/>
+            <a:ext cx="1178006" cy="716692"/>
+          </a:xfrm>
+          <a:prstGeom prst="rightArrow">
+            <a:avLst/>
+          </a:prstGeom>
+          <a:solidFill>
+            <a:srgbClr val="FF0000"/>
+          </a:solidFill>
+        </p:spPr>
+        <p:style>
+          <a:lnRef idx="1">
+            <a:schemeClr val="accent1"/>
+          </a:lnRef>
+          <a:fillRef idx="3">
+            <a:schemeClr val="accent1"/>
+          </a:fillRef>
+          <a:effectRef idx="2">
+            <a:schemeClr val="accent1"/>
+          </a:effectRef>
+          <a:fontRef idx="minor">
+            <a:schemeClr val="lt1"/>
+          </a:fontRef>
+        </p:style>
+        <p:txBody>
+          <a:bodyPr rtlCol="0" anchor="ctr"/>
+          <a:lstStyle/>
+          <a:p>
+            <a:pPr algn="ctr"/>
+            <a:endParaRPr lang="en-US"/>
+          </a:p>
+        </p:txBody>
+      </p:sp>
+      <p:pic>
+        <p:nvPicPr>
+          <p:cNvPr id="15" name="Picture 14">
+            <a:extLst>
+              <a:ext uri="{FF2B5EF4-FFF2-40B4-BE49-F238E27FC236}">
+                <a16:creationId xmlns:a16="http://schemas.microsoft.com/office/drawing/2014/main" id="{DEFD6414-7902-435E-1F01-1B710390BA83}"/>
+              </a:ext>
+            </a:extLst>
+          </p:cNvPr>
+          <p:cNvPicPr>
+            <a:picLocks noChangeAspect="1"/>
+          </p:cNvPicPr>
+          <p:nvPr/>
+        </p:nvPicPr>
+        <p:blipFill>
+          <a:blip r:embed="rId5"/>
+          <a:stretch>
+            <a:fillRect/>
+          </a:stretch>
+        </p:blipFill>
+        <p:spPr>
+          <a:xfrm>
+            <a:off x="1303919" y="23396668"/>
+            <a:ext cx="3150470" cy="3624225"/>
+          </a:xfrm>
+          <a:prstGeom prst="rect">
+            <a:avLst/>
+          </a:prstGeom>
+        </p:spPr>
+      </p:pic>
+      <p:sp>
+        <p:nvSpPr>
+          <p:cNvPr id="16" name="Right Arrow 15">
+            <a:extLst>
+              <a:ext uri="{FF2B5EF4-FFF2-40B4-BE49-F238E27FC236}">
+                <a16:creationId xmlns:a16="http://schemas.microsoft.com/office/drawing/2014/main" id="{92E9D2D0-E2B5-1D2E-1C0B-60FCE8FFA216}"/>
+              </a:ext>
+            </a:extLst>
+          </p:cNvPr>
+          <p:cNvSpPr/>
+          <p:nvPr/>
+        </p:nvSpPr>
+        <p:spPr>
+          <a:xfrm>
+            <a:off x="2870916" y="24739572"/>
+            <a:ext cx="1178006" cy="716692"/>
+          </a:xfrm>
+          <a:prstGeom prst="rightArrow">
+            <a:avLst/>
+          </a:prstGeom>
+          <a:solidFill>
+            <a:srgbClr val="FF0000"/>
+          </a:solidFill>
+        </p:spPr>
+        <p:style>
+          <a:lnRef idx="1">
+            <a:schemeClr val="accent1"/>
+          </a:lnRef>
+          <a:fillRef idx="3">
+            <a:schemeClr val="accent1"/>
+          </a:fillRef>
+          <a:effectRef idx="2">
+            <a:schemeClr val="accent1"/>
+          </a:effectRef>
+          <a:fontRef idx="minor">
+            <a:schemeClr val="lt1"/>
+          </a:fontRef>
+        </p:style>
+        <p:txBody>
+          <a:bodyPr rtlCol="0" anchor="ctr"/>
+          <a:lstStyle/>
+          <a:p>
+            <a:pPr algn="ctr"/>
+            <a:endParaRPr lang="en-US"/>
+          </a:p>
+        </p:txBody>
+      </p:sp>
+      <p:sp>
+        <p:nvSpPr>
+          <p:cNvPr id="17" name="Right Arrow 16">
+            <a:extLst>
+              <a:ext uri="{FF2B5EF4-FFF2-40B4-BE49-F238E27FC236}">
+                <a16:creationId xmlns:a16="http://schemas.microsoft.com/office/drawing/2014/main" id="{AE6987BC-82E0-7FC6-B5B9-E42A5DFC8988}"/>
+              </a:ext>
+            </a:extLst>
+          </p:cNvPr>
+          <p:cNvSpPr/>
+          <p:nvPr/>
+        </p:nvSpPr>
+        <p:spPr>
+          <a:xfrm rot="10800000">
+            <a:off x="1712910" y="24739572"/>
+            <a:ext cx="1178006" cy="716692"/>
+          </a:xfrm>
+          <a:prstGeom prst="rightArrow">
+            <a:avLst/>
+          </a:prstGeom>
+          <a:solidFill>
+            <a:srgbClr val="FF0000"/>
+          </a:solidFill>
+        </p:spPr>
+        <p:style>
+          <a:lnRef idx="1">
+            <a:schemeClr val="accent1"/>
+          </a:lnRef>
+          <a:fillRef idx="3">
+            <a:schemeClr val="accent1"/>
+          </a:fillRef>
+          <a:effectRef idx="2">
+            <a:schemeClr val="accent1"/>
+          </a:effectRef>
+          <a:fontRef idx="minor">
+            <a:schemeClr val="lt1"/>
+          </a:fontRef>
+        </p:style>
+        <p:txBody>
+          <a:bodyPr rtlCol="0" anchor="ctr"/>
+          <a:lstStyle/>
+          <a:p>
+            <a:pPr algn="ctr"/>
+            <a:endParaRPr lang="en-US"/>
+          </a:p>
+        </p:txBody>
+      </p:sp>
+      <p:pic>
+        <p:nvPicPr>
+          <p:cNvPr id="18" name="Picture 17">
+            <a:extLst>
+              <a:ext uri="{FF2B5EF4-FFF2-40B4-BE49-F238E27FC236}">
+                <a16:creationId xmlns:a16="http://schemas.microsoft.com/office/drawing/2014/main" id="{89D6C25E-23C9-C495-4CB7-C4177CF53DBF}"/>
+              </a:ext>
+            </a:extLst>
+          </p:cNvPr>
+          <p:cNvPicPr>
+            <a:picLocks noChangeAspect="1"/>
+          </p:cNvPicPr>
+          <p:nvPr/>
+        </p:nvPicPr>
+        <p:blipFill>
+          <a:blip r:embed="rId6"/>
+          <a:stretch>
+            <a:fillRect/>
+          </a:stretch>
+        </p:blipFill>
+        <p:spPr>
+          <a:xfrm>
+            <a:off x="5632395" y="23356412"/>
+            <a:ext cx="3150470" cy="3624225"/>
+          </a:xfrm>
+          <a:prstGeom prst="rect">
+            <a:avLst/>
+          </a:prstGeom>
+        </p:spPr>
+      </p:pic>
+      <p:sp>
+        <p:nvSpPr>
+          <p:cNvPr id="19" name="Right Arrow 18">
+            <a:extLst>
+              <a:ext uri="{FF2B5EF4-FFF2-40B4-BE49-F238E27FC236}">
+                <a16:creationId xmlns:a16="http://schemas.microsoft.com/office/drawing/2014/main" id="{FDD89146-4D4D-67DA-9607-C75AE64D1542}"/>
+              </a:ext>
+            </a:extLst>
+          </p:cNvPr>
+          <p:cNvSpPr/>
+          <p:nvPr/>
+        </p:nvSpPr>
+        <p:spPr>
+          <a:xfrm>
+            <a:off x="4497341" y="24739572"/>
+            <a:ext cx="1178006" cy="716692"/>
+          </a:xfrm>
+          <a:prstGeom prst="rightArrow">
+            <a:avLst/>
+          </a:prstGeom>
+          <a:solidFill>
+            <a:srgbClr val="FF0000"/>
+          </a:solidFill>
+        </p:spPr>
+        <p:style>
+          <a:lnRef idx="1">
+            <a:schemeClr val="accent1"/>
+          </a:lnRef>
+          <a:fillRef idx="3">
+            <a:schemeClr val="accent1"/>
+          </a:fillRef>
+          <a:effectRef idx="2">
+            <a:schemeClr val="accent1"/>
+          </a:effectRef>
+          <a:fontRef idx="minor">
+            <a:schemeClr val="lt1"/>
+          </a:fontRef>
+        </p:style>
+        <p:txBody>
+          <a:bodyPr rtlCol="0" anchor="ctr"/>
+          <a:lstStyle/>
+          <a:p>
+            <a:pPr algn="ctr"/>
+            <a:endParaRPr lang="en-US"/>
+          </a:p>
+        </p:txBody>
+      </p:sp>
+      <p:pic>
+        <p:nvPicPr>
+          <p:cNvPr id="20" name="Picture 19">
+            <a:extLst>
+              <a:ext uri="{FF2B5EF4-FFF2-40B4-BE49-F238E27FC236}">
+                <a16:creationId xmlns:a16="http://schemas.microsoft.com/office/drawing/2014/main" id="{C06EB202-4CAA-C1FC-B57B-6502C518FE87}"/>
+              </a:ext>
+            </a:extLst>
+          </p:cNvPr>
+          <p:cNvPicPr>
+            <a:picLocks noChangeAspect="1"/>
+          </p:cNvPicPr>
+          <p:nvPr/>
+        </p:nvPicPr>
+        <p:blipFill>
+          <a:blip r:embed="rId7"/>
+          <a:stretch>
+            <a:fillRect/>
+          </a:stretch>
+        </p:blipFill>
+        <p:spPr>
+          <a:xfrm>
+            <a:off x="11841894" y="6476021"/>
+            <a:ext cx="3809203" cy="4382015"/>
+          </a:xfrm>
+          <a:prstGeom prst="rect">
+            <a:avLst/>
+          </a:prstGeom>
+        </p:spPr>
+      </p:pic>
+      <p:sp>
+        <p:nvSpPr>
+          <p:cNvPr id="21" name="Down Arrow 20">
+            <a:extLst>
+              <a:ext uri="{FF2B5EF4-FFF2-40B4-BE49-F238E27FC236}">
+                <a16:creationId xmlns:a16="http://schemas.microsoft.com/office/drawing/2014/main" id="{B5228B4E-4DF5-9933-7E71-462F3577DEDF}"/>
+              </a:ext>
+            </a:extLst>
+          </p:cNvPr>
+          <p:cNvSpPr/>
+          <p:nvPr/>
+        </p:nvSpPr>
+        <p:spPr>
+          <a:xfrm rot="10800000">
+            <a:off x="13375791" y="8073903"/>
+            <a:ext cx="741407" cy="1186248"/>
+          </a:xfrm>
+          <a:prstGeom prst="downArrow">
+            <a:avLst/>
+          </a:prstGeom>
+          <a:solidFill>
+            <a:srgbClr val="FF0000"/>
+          </a:solidFill>
+        </p:spPr>
+        <p:style>
+          <a:lnRef idx="1">
+            <a:schemeClr val="accent1"/>
+          </a:lnRef>
+          <a:fillRef idx="3">
+            <a:schemeClr val="accent1"/>
+          </a:fillRef>
+          <a:effectRef idx="2">
+            <a:schemeClr val="accent1"/>
+          </a:effectRef>
+          <a:fontRef idx="minor">
+            <a:schemeClr val="lt1"/>
+          </a:fontRef>
+        </p:style>
+        <p:txBody>
+          <a:bodyPr rtlCol="0" anchor="ctr"/>
+          <a:lstStyle/>
+          <a:p>
+            <a:pPr algn="ctr"/>
+            <a:endParaRPr lang="en-US" dirty="0"/>
+          </a:p>
+        </p:txBody>
+      </p:sp>
+      <p:sp>
+        <p:nvSpPr>
+          <p:cNvPr id="22" name="Right Arrow 21">
+            <a:extLst>
+              <a:ext uri="{FF2B5EF4-FFF2-40B4-BE49-F238E27FC236}">
+                <a16:creationId xmlns:a16="http://schemas.microsoft.com/office/drawing/2014/main" id="{0C8566AB-453E-89CD-9616-CF5FE95F8660}"/>
+              </a:ext>
+            </a:extLst>
+          </p:cNvPr>
+          <p:cNvSpPr/>
+          <p:nvPr/>
+        </p:nvSpPr>
+        <p:spPr>
+          <a:xfrm>
+            <a:off x="15651097" y="8358109"/>
+            <a:ext cx="1166244" cy="617837"/>
+          </a:xfrm>
+          <a:prstGeom prst="rightArrow">
+            <a:avLst/>
+          </a:prstGeom>
+          <a:solidFill>
+            <a:srgbClr val="FF0000"/>
+          </a:solidFill>
+        </p:spPr>
+        <p:style>
+          <a:lnRef idx="1">
+            <a:schemeClr val="accent1"/>
+          </a:lnRef>
+          <a:fillRef idx="3">
+            <a:schemeClr val="accent1"/>
+          </a:fillRef>
+          <a:effectRef idx="2">
+            <a:schemeClr val="accent1"/>
+          </a:effectRef>
+          <a:fontRef idx="minor">
+            <a:schemeClr val="lt1"/>
+          </a:fontRef>
+        </p:style>
+        <p:txBody>
+          <a:bodyPr rtlCol="0" anchor="ctr"/>
+          <a:lstStyle/>
+          <a:p>
+            <a:pPr algn="ctr"/>
+            <a:endParaRPr lang="en-US"/>
+          </a:p>
+        </p:txBody>
+      </p:sp>
+      <p:pic>
+        <p:nvPicPr>
+          <p:cNvPr id="23" name="Picture 22">
+            <a:extLst>
+              <a:ext uri="{FF2B5EF4-FFF2-40B4-BE49-F238E27FC236}">
+                <a16:creationId xmlns:a16="http://schemas.microsoft.com/office/drawing/2014/main" id="{C5592012-2C0F-70E1-9A27-550D0488AC12}"/>
+              </a:ext>
+            </a:extLst>
+          </p:cNvPr>
+          <p:cNvPicPr>
+            <a:picLocks noChangeAspect="1"/>
+          </p:cNvPicPr>
+          <p:nvPr/>
+        </p:nvPicPr>
+        <p:blipFill>
+          <a:blip r:embed="rId8"/>
+          <a:stretch>
+            <a:fillRect/>
+          </a:stretch>
+        </p:blipFill>
+        <p:spPr>
+          <a:xfrm>
+            <a:off x="16817341" y="6476021"/>
+            <a:ext cx="3809203" cy="4382015"/>
+          </a:xfrm>
+          <a:prstGeom prst="rect">
+            <a:avLst/>
+          </a:prstGeom>
+        </p:spPr>
+      </p:pic>
+      <p:pic>
+        <p:nvPicPr>
+          <p:cNvPr id="24" name="Picture 23">
+            <a:extLst>
+              <a:ext uri="{FF2B5EF4-FFF2-40B4-BE49-F238E27FC236}">
+                <a16:creationId xmlns:a16="http://schemas.microsoft.com/office/drawing/2014/main" id="{298FCFB0-E5DC-6A73-0D06-076D34AFF46B}"/>
+              </a:ext>
+            </a:extLst>
+          </p:cNvPr>
+          <p:cNvPicPr>
+            <a:picLocks noChangeAspect="1"/>
+          </p:cNvPicPr>
+          <p:nvPr/>
+        </p:nvPicPr>
+        <p:blipFill>
+          <a:blip r:embed="rId9"/>
+          <a:stretch>
+            <a:fillRect/>
+          </a:stretch>
+        </p:blipFill>
+        <p:spPr>
+          <a:xfrm>
+            <a:off x="11652418" y="13233663"/>
+            <a:ext cx="3553090" cy="2593891"/>
+          </a:xfrm>
+          <a:prstGeom prst="rect">
+            <a:avLst/>
+          </a:prstGeom>
+        </p:spPr>
+      </p:pic>
+      <p:pic>
+        <p:nvPicPr>
+          <p:cNvPr id="25" name="Picture 24">
+            <a:extLst>
+              <a:ext uri="{FF2B5EF4-FFF2-40B4-BE49-F238E27FC236}">
+                <a16:creationId xmlns:a16="http://schemas.microsoft.com/office/drawing/2014/main" id="{8D89B8E3-ED01-EEEB-4E6C-30B9ABBAD1EF}"/>
+              </a:ext>
+            </a:extLst>
+          </p:cNvPr>
+          <p:cNvPicPr>
+            <a:picLocks noChangeAspect="1"/>
+          </p:cNvPicPr>
+          <p:nvPr/>
+        </p:nvPicPr>
+        <p:blipFill>
+          <a:blip r:embed="rId10"/>
+          <a:stretch>
+            <a:fillRect/>
+          </a:stretch>
+        </p:blipFill>
+        <p:spPr>
+          <a:xfrm>
+            <a:off x="16345761" y="13233663"/>
+            <a:ext cx="3553089" cy="2612565"/>
+          </a:xfrm>
+          <a:prstGeom prst="rect">
+            <a:avLst/>
+          </a:prstGeom>
+        </p:spPr>
+      </p:pic>
+      <p:sp>
+        <p:nvSpPr>
+          <p:cNvPr id="26" name="Right Arrow 25">
+            <a:extLst>
+              <a:ext uri="{FF2B5EF4-FFF2-40B4-BE49-F238E27FC236}">
+                <a16:creationId xmlns:a16="http://schemas.microsoft.com/office/drawing/2014/main" id="{23C12A5C-3217-CC39-88F0-5AEFE0EEC547}"/>
+              </a:ext>
+            </a:extLst>
+          </p:cNvPr>
+          <p:cNvSpPr/>
+          <p:nvPr/>
+        </p:nvSpPr>
+        <p:spPr>
+          <a:xfrm>
+            <a:off x="15179517" y="14318484"/>
+            <a:ext cx="1166244" cy="617837"/>
+          </a:xfrm>
+          <a:prstGeom prst="rightArrow">
+            <a:avLst/>
+          </a:prstGeom>
+          <a:solidFill>
+            <a:srgbClr val="FF0000"/>
+          </a:solidFill>
+        </p:spPr>
+        <p:style>
+          <a:lnRef idx="1">
+            <a:schemeClr val="accent1"/>
+          </a:lnRef>
+          <a:fillRef idx="3">
+            <a:schemeClr val="accent1"/>
+          </a:fillRef>
+          <a:effectRef idx="2">
+            <a:schemeClr val="accent1"/>
+          </a:effectRef>
+          <a:fontRef idx="minor">
+            <a:schemeClr val="lt1"/>
+          </a:fontRef>
+        </p:style>
+        <p:txBody>
+          <a:bodyPr rtlCol="0" anchor="ctr"/>
+          <a:lstStyle/>
+          <a:p>
+            <a:pPr algn="ctr"/>
+            <a:endParaRPr lang="en-US"/>
           </a:p>
         </p:txBody>
       </p:sp>

</xml_diff>